<commit_message>
added models summary notebook
</commit_message>
<xml_diff>
--- a/Poster/Poster.pptx
+++ b/Poster/Poster.pptx
@@ -116,12 +116,141 @@
 <p1510:revInfo xmlns:a="http://schemas.openxmlformats.org/drawingml/2006/main" xmlns:r="http://schemas.openxmlformats.org/officeDocument/2006/relationships" xmlns:p1510="http://schemas.microsoft.com/office/powerpoint/2015/10/main">
   <p1510:revLst>
     <p1510:client id="{5A563461-806C-408C-9B33-29D1F56EEA5F}" v="42" dt="2023-04-14T20:44:33.411"/>
+    <p1510:client id="{9A612CE6-B5F7-4238-B05D-8FFC9C8A4188}" v="4" dt="2023-04-15T18:32:19.256"/>
   </p1510:revLst>
 </p1510:revInfo>
 </file>
 
 <file path=ppt/changesInfos/changesInfo1.xml><?xml version="1.0" encoding="utf-8"?>
 <pc:chgInfo xmlns:a="http://schemas.openxmlformats.org/drawingml/2006/main" xmlns:r="http://schemas.openxmlformats.org/officeDocument/2006/relationships" xmlns:ac="http://schemas.microsoft.com/office/drawing/2013/main/command" xmlns:pc="http://schemas.microsoft.com/office/powerpoint/2013/main/command">
+  <pc:docChgLst>
+    <pc:chgData name="Anne Versleijen" userId="82fb0e19-6272-4065-8698-a218790ab681" providerId="ADAL" clId="{9A612CE6-B5F7-4238-B05D-8FFC9C8A4188}"/>
+    <pc:docChg chg="undo custSel modSld">
+      <pc:chgData name="Anne Versleijen" userId="82fb0e19-6272-4065-8698-a218790ab681" providerId="ADAL" clId="{9A612CE6-B5F7-4238-B05D-8FFC9C8A4188}" dt="2023-04-15T18:48:06.560" v="1366" actId="1036"/>
+      <pc:docMkLst>
+        <pc:docMk/>
+      </pc:docMkLst>
+      <pc:sldChg chg="addSp delSp modSp mod">
+        <pc:chgData name="Anne Versleijen" userId="82fb0e19-6272-4065-8698-a218790ab681" providerId="ADAL" clId="{9A612CE6-B5F7-4238-B05D-8FFC9C8A4188}" dt="2023-04-15T18:48:06.560" v="1366" actId="1036"/>
+        <pc:sldMkLst>
+          <pc:docMk/>
+          <pc:sldMk cId="4122528354" sldId="257"/>
+        </pc:sldMkLst>
+        <pc:spChg chg="mod">
+          <ac:chgData name="Anne Versleijen" userId="82fb0e19-6272-4065-8698-a218790ab681" providerId="ADAL" clId="{9A612CE6-B5F7-4238-B05D-8FFC9C8A4188}" dt="2023-04-15T18:26:04.822" v="389" actId="1076"/>
+          <ac:spMkLst>
+            <pc:docMk/>
+            <pc:sldMk cId="4122528354" sldId="257"/>
+            <ac:spMk id="8" creationId="{CA0B186D-E6D0-88B1-2450-CF87583BDE38}"/>
+          </ac:spMkLst>
+        </pc:spChg>
+        <pc:spChg chg="mod">
+          <ac:chgData name="Anne Versleijen" userId="82fb0e19-6272-4065-8698-a218790ab681" providerId="ADAL" clId="{9A612CE6-B5F7-4238-B05D-8FFC9C8A4188}" dt="2023-04-15T18:25:51.121" v="386" actId="1036"/>
+          <ac:spMkLst>
+            <pc:docMk/>
+            <pc:sldMk cId="4122528354" sldId="257"/>
+            <ac:spMk id="10" creationId="{6F553846-8B10-5587-CDD7-9215ADFFC796}"/>
+          </ac:spMkLst>
+        </pc:spChg>
+        <pc:spChg chg="del">
+          <ac:chgData name="Anne Versleijen" userId="82fb0e19-6272-4065-8698-a218790ab681" providerId="ADAL" clId="{9A612CE6-B5F7-4238-B05D-8FFC9C8A4188}" dt="2023-04-15T18:19:33.792" v="1" actId="478"/>
+          <ac:spMkLst>
+            <pc:docMk/>
+            <pc:sldMk cId="4122528354" sldId="257"/>
+            <ac:spMk id="11" creationId="{2B8E93C6-F9F5-6B98-6EE5-C63022EE6BB2}"/>
+          </ac:spMkLst>
+        </pc:spChg>
+        <pc:spChg chg="mod">
+          <ac:chgData name="Anne Versleijen" userId="82fb0e19-6272-4065-8698-a218790ab681" providerId="ADAL" clId="{9A612CE6-B5F7-4238-B05D-8FFC9C8A4188}" dt="2023-04-15T18:25:07.439" v="364" actId="14100"/>
+          <ac:spMkLst>
+            <pc:docMk/>
+            <pc:sldMk cId="4122528354" sldId="257"/>
+            <ac:spMk id="13" creationId="{8CE5ABF7-4463-87B7-7326-EF823C247F37}"/>
+          </ac:spMkLst>
+        </pc:spChg>
+        <pc:spChg chg="mod">
+          <ac:chgData name="Anne Versleijen" userId="82fb0e19-6272-4065-8698-a218790ab681" providerId="ADAL" clId="{9A612CE6-B5F7-4238-B05D-8FFC9C8A4188}" dt="2023-04-15T18:46:51.593" v="1321" actId="20577"/>
+          <ac:spMkLst>
+            <pc:docMk/>
+            <pc:sldMk cId="4122528354" sldId="257"/>
+            <ac:spMk id="16" creationId="{9787EA94-4CF8-BC7D-CFA7-1DE1950AE13E}"/>
+          </ac:spMkLst>
+        </pc:spChg>
+        <pc:spChg chg="add del mod">
+          <ac:chgData name="Anne Versleijen" userId="82fb0e19-6272-4065-8698-a218790ab681" providerId="ADAL" clId="{9A612CE6-B5F7-4238-B05D-8FFC9C8A4188}" dt="2023-04-15T18:28:50.742" v="716" actId="1036"/>
+          <ac:spMkLst>
+            <pc:docMk/>
+            <pc:sldMk cId="4122528354" sldId="257"/>
+            <ac:spMk id="20" creationId="{B86F8254-E121-77DD-5085-BA2B06BD60CD}"/>
+          </ac:spMkLst>
+        </pc:spChg>
+        <pc:spChg chg="add mod">
+          <ac:chgData name="Anne Versleijen" userId="82fb0e19-6272-4065-8698-a218790ab681" providerId="ADAL" clId="{9A612CE6-B5F7-4238-B05D-8FFC9C8A4188}" dt="2023-04-15T18:48:06.560" v="1366" actId="1036"/>
+          <ac:spMkLst>
+            <pc:docMk/>
+            <pc:sldMk cId="4122528354" sldId="257"/>
+            <ac:spMk id="21" creationId="{816E3285-BDAB-3C2E-ADA5-98A8917B08DA}"/>
+          </ac:spMkLst>
+        </pc:spChg>
+        <pc:spChg chg="add mod">
+          <ac:chgData name="Anne Versleijen" userId="82fb0e19-6272-4065-8698-a218790ab681" providerId="ADAL" clId="{9A612CE6-B5F7-4238-B05D-8FFC9C8A4188}" dt="2023-04-15T18:36:50.985" v="867" actId="1035"/>
+          <ac:spMkLst>
+            <pc:docMk/>
+            <pc:sldMk cId="4122528354" sldId="257"/>
+            <ac:spMk id="25" creationId="{CDF9FE4F-A640-DE05-7EED-9A4E23824C4E}"/>
+          </ac:spMkLst>
+        </pc:spChg>
+        <pc:spChg chg="mod">
+          <ac:chgData name="Anne Versleijen" userId="82fb0e19-6272-4065-8698-a218790ab681" providerId="ADAL" clId="{9A612CE6-B5F7-4238-B05D-8FFC9C8A4188}" dt="2023-04-15T18:32:02.143" v="721" actId="1076"/>
+          <ac:spMkLst>
+            <pc:docMk/>
+            <pc:sldMk cId="4122528354" sldId="257"/>
+            <ac:spMk id="29" creationId="{7B13B08F-0FAD-473D-F737-2090BBEB93F1}"/>
+          </ac:spMkLst>
+        </pc:spChg>
+        <pc:spChg chg="mod">
+          <ac:chgData name="Anne Versleijen" userId="82fb0e19-6272-4065-8698-a218790ab681" providerId="ADAL" clId="{9A612CE6-B5F7-4238-B05D-8FFC9C8A4188}" dt="2023-04-15T18:47:59.373" v="1354" actId="1035"/>
+          <ac:spMkLst>
+            <pc:docMk/>
+            <pc:sldMk cId="4122528354" sldId="257"/>
+            <ac:spMk id="30" creationId="{FA9B49E2-0543-F03F-9F25-50DDD0DFE728}"/>
+          </ac:spMkLst>
+        </pc:spChg>
+        <pc:spChg chg="mod">
+          <ac:chgData name="Anne Versleijen" userId="82fb0e19-6272-4065-8698-a218790ab681" providerId="ADAL" clId="{9A612CE6-B5F7-4238-B05D-8FFC9C8A4188}" dt="2023-04-15T18:47:55.973" v="1336" actId="1036"/>
+          <ac:spMkLst>
+            <pc:docMk/>
+            <pc:sldMk cId="4122528354" sldId="257"/>
+            <ac:spMk id="31" creationId="{D215C282-EFB8-97B7-0965-8167CF471186}"/>
+          </ac:spMkLst>
+        </pc:spChg>
+        <pc:picChg chg="add mod ord">
+          <ac:chgData name="Anne Versleijen" userId="82fb0e19-6272-4065-8698-a218790ab681" providerId="ADAL" clId="{9A612CE6-B5F7-4238-B05D-8FFC9C8A4188}" dt="2023-04-15T18:28:58.110" v="717" actId="1036"/>
+          <ac:picMkLst>
+            <pc:docMk/>
+            <pc:sldMk cId="4122528354" sldId="257"/>
+            <ac:picMk id="18" creationId="{9E4D005D-3920-DDA8-94AA-0687811630AC}"/>
+          </ac:picMkLst>
+        </pc:picChg>
+        <pc:picChg chg="mod">
+          <ac:chgData name="Anne Versleijen" userId="82fb0e19-6272-4065-8698-a218790ab681" providerId="ADAL" clId="{9A612CE6-B5F7-4238-B05D-8FFC9C8A4188}" dt="2023-04-15T18:48:06.560" v="1366" actId="1036"/>
+          <ac:picMkLst>
+            <pc:docMk/>
+            <pc:sldMk cId="4122528354" sldId="257"/>
+            <ac:picMk id="23" creationId="{ADE426D4-03FF-DDF0-53FD-62D6C8188B96}"/>
+          </ac:picMkLst>
+        </pc:picChg>
+        <pc:picChg chg="del">
+          <ac:chgData name="Anne Versleijen" userId="82fb0e19-6272-4065-8698-a218790ab681" providerId="ADAL" clId="{9A612CE6-B5F7-4238-B05D-8FFC9C8A4188}" dt="2023-04-15T18:19:29.661" v="0" actId="478"/>
+          <ac:picMkLst>
+            <pc:docMk/>
+            <pc:sldMk cId="4122528354" sldId="257"/>
+            <ac:picMk id="28" creationId="{B481E489-A05F-003C-B7F8-5D131904D70E}"/>
+          </ac:picMkLst>
+        </pc:picChg>
+      </pc:sldChg>
+    </pc:docChg>
+  </pc:docChgLst>
   <pc:docChgLst>
     <pc:chgData name="Anne Versleijen" userId="82fb0e19-6272-4065-8698-a218790ab681" providerId="ADAL" clId="{5A563461-806C-408C-9B33-29D1F56EEA5F}"/>
     <pc:docChg chg="undo custSel addSld delSld modSld">
@@ -1016,7 +1145,7 @@
           <a:p>
             <a:fld id="{A8C721A8-0FC4-4D74-9D1D-FEFB5425F115}" type="slidenum">
               <a:rPr lang="nl-NL" smtClean="0"/>
-              <a:t>‹#›</a:t>
+              <a:t>‹nr.›</a:t>
             </a:fld>
             <a:endParaRPr lang="nl-NL"/>
           </a:p>
@@ -1186,7 +1315,7 @@
           <a:p>
             <a:fld id="{A8C721A8-0FC4-4D74-9D1D-FEFB5425F115}" type="slidenum">
               <a:rPr lang="nl-NL" smtClean="0"/>
-              <a:t>‹#›</a:t>
+              <a:t>‹nr.›</a:t>
             </a:fld>
             <a:endParaRPr lang="nl-NL"/>
           </a:p>
@@ -1366,7 +1495,7 @@
           <a:p>
             <a:fld id="{A8C721A8-0FC4-4D74-9D1D-FEFB5425F115}" type="slidenum">
               <a:rPr lang="nl-NL" smtClean="0"/>
-              <a:t>‹#›</a:t>
+              <a:t>‹nr.›</a:t>
             </a:fld>
             <a:endParaRPr lang="nl-NL"/>
           </a:p>
@@ -1536,7 +1665,7 @@
           <a:p>
             <a:fld id="{A8C721A8-0FC4-4D74-9D1D-FEFB5425F115}" type="slidenum">
               <a:rPr lang="nl-NL" smtClean="0"/>
-              <a:t>‹#›</a:t>
+              <a:t>‹nr.›</a:t>
             </a:fld>
             <a:endParaRPr lang="nl-NL"/>
           </a:p>
@@ -1780,7 +1909,7 @@
           <a:p>
             <a:fld id="{A8C721A8-0FC4-4D74-9D1D-FEFB5425F115}" type="slidenum">
               <a:rPr lang="nl-NL" smtClean="0"/>
-              <a:t>‹#›</a:t>
+              <a:t>‹nr.›</a:t>
             </a:fld>
             <a:endParaRPr lang="nl-NL"/>
           </a:p>
@@ -2012,7 +2141,7 @@
           <a:p>
             <a:fld id="{A8C721A8-0FC4-4D74-9D1D-FEFB5425F115}" type="slidenum">
               <a:rPr lang="nl-NL" smtClean="0"/>
-              <a:t>‹#›</a:t>
+              <a:t>‹nr.›</a:t>
             </a:fld>
             <a:endParaRPr lang="nl-NL"/>
           </a:p>
@@ -2379,7 +2508,7 @@
           <a:p>
             <a:fld id="{A8C721A8-0FC4-4D74-9D1D-FEFB5425F115}" type="slidenum">
               <a:rPr lang="nl-NL" smtClean="0"/>
-              <a:t>‹#›</a:t>
+              <a:t>‹nr.›</a:t>
             </a:fld>
             <a:endParaRPr lang="nl-NL"/>
           </a:p>
@@ -2497,7 +2626,7 @@
           <a:p>
             <a:fld id="{A8C721A8-0FC4-4D74-9D1D-FEFB5425F115}" type="slidenum">
               <a:rPr lang="nl-NL" smtClean="0"/>
-              <a:t>‹#›</a:t>
+              <a:t>‹nr.›</a:t>
             </a:fld>
             <a:endParaRPr lang="nl-NL"/>
           </a:p>
@@ -2592,7 +2721,7 @@
           <a:p>
             <a:fld id="{A8C721A8-0FC4-4D74-9D1D-FEFB5425F115}" type="slidenum">
               <a:rPr lang="nl-NL" smtClean="0"/>
-              <a:t>‹#›</a:t>
+              <a:t>‹nr.›</a:t>
             </a:fld>
             <a:endParaRPr lang="nl-NL"/>
           </a:p>
@@ -2869,7 +2998,7 @@
           <a:p>
             <a:fld id="{A8C721A8-0FC4-4D74-9D1D-FEFB5425F115}" type="slidenum">
               <a:rPr lang="nl-NL" smtClean="0"/>
-              <a:t>‹#›</a:t>
+              <a:t>‹nr.›</a:t>
             </a:fld>
             <a:endParaRPr lang="nl-NL"/>
           </a:p>
@@ -3126,7 +3255,7 @@
           <a:p>
             <a:fld id="{A8C721A8-0FC4-4D74-9D1D-FEFB5425F115}" type="slidenum">
               <a:rPr lang="nl-NL" smtClean="0"/>
-              <a:t>‹#›</a:t>
+              <a:t>‹nr.›</a:t>
             </a:fld>
             <a:endParaRPr lang="nl-NL"/>
           </a:p>
@@ -3375,7 +3504,7 @@
           <a:p>
             <a:fld id="{A8C721A8-0FC4-4D74-9D1D-FEFB5425F115}" type="slidenum">
               <a:rPr lang="nl-NL" smtClean="0"/>
-              <a:t>‹#›</a:t>
+              <a:t>‹nr.›</a:t>
             </a:fld>
             <a:endParaRPr lang="nl-NL"/>
           </a:p>
@@ -3704,10 +3833,10 @@
       </p:grpSpPr>
       <p:pic>
         <p:nvPicPr>
-          <p:cNvPr id="28" name="Afbeelding 27" descr="Afbeelding met kaart&#10;&#10;Automatisch gegenereerde beschrijving">
+          <p:cNvPr id="18" name="Afbeelding 17" descr="Afbeelding met kaart&#10;&#10;Automatisch gegenereerde beschrijving">
             <a:extLst>
               <a:ext uri="{FF2B5EF4-FFF2-40B4-BE49-F238E27FC236}">
-                <a16:creationId xmlns:a16="http://schemas.microsoft.com/office/drawing/2014/main" id="{B481E489-A05F-003C-B7F8-5D131904D70E}"/>
+                <a16:creationId xmlns:a16="http://schemas.microsoft.com/office/drawing/2014/main" id="{9E4D005D-3920-DDA8-94AA-0687811630AC}"/>
               </a:ext>
             </a:extLst>
           </p:cNvPr>
@@ -3730,8 +3859,8 @@
         </p:blipFill>
         <p:spPr>
           <a:xfrm>
-            <a:off x="1990095" y="8970307"/>
-            <a:ext cx="10689336" cy="7559040"/>
+            <a:off x="1772472" y="6610279"/>
+            <a:ext cx="10094066" cy="7138090"/>
           </a:xfrm>
           <a:prstGeom prst="rect">
             <a:avLst/>
@@ -3918,175 +4047,25 @@
           </a:bodyPr>
           <a:lstStyle/>
           <a:p>
-            <a:pPr algn="ctr"/>
-            <a:r>
-              <a:rPr lang="nl-NL" sz="2400" dirty="0">
-                <a:latin typeface="Arial" panose="020B0604020202020204" pitchFamily="34" charset="0"/>
-                <a:cs typeface="Arial" panose="020B0604020202020204" pitchFamily="34" charset="0"/>
-              </a:rPr>
-              <a:t>For </a:t>
-            </a:r>
-            <a:r>
-              <a:rPr lang="nl-NL" sz="2400" dirty="0" err="1">
-                <a:latin typeface="Arial" panose="020B0604020202020204" pitchFamily="34" charset="0"/>
-                <a:cs typeface="Arial" panose="020B0604020202020204" pitchFamily="34" charset="0"/>
-              </a:rPr>
-              <a:t>the</a:t>
-            </a:r>
-            <a:r>
-              <a:rPr lang="nl-NL" sz="2400" dirty="0">
-                <a:latin typeface="Arial" panose="020B0604020202020204" pitchFamily="34" charset="0"/>
-                <a:cs typeface="Arial" panose="020B0604020202020204" pitchFamily="34" charset="0"/>
-              </a:rPr>
-              <a:t> </a:t>
-            </a:r>
-            <a:r>
-              <a:rPr lang="nl-NL" sz="2400" dirty="0" err="1">
-                <a:latin typeface="Arial" panose="020B0604020202020204" pitchFamily="34" charset="0"/>
-                <a:cs typeface="Arial" panose="020B0604020202020204" pitchFamily="34" charset="0"/>
-              </a:rPr>
-              <a:t>precipitation</a:t>
-            </a:r>
-            <a:r>
-              <a:rPr lang="nl-NL" sz="2400" dirty="0">
-                <a:latin typeface="Arial" panose="020B0604020202020204" pitchFamily="34" charset="0"/>
-                <a:cs typeface="Arial" panose="020B0604020202020204" pitchFamily="34" charset="0"/>
-              </a:rPr>
-              <a:t> data, station data is </a:t>
-            </a:r>
-            <a:r>
-              <a:rPr lang="nl-NL" sz="2400" dirty="0" err="1">
-                <a:latin typeface="Arial" panose="020B0604020202020204" pitchFamily="34" charset="0"/>
-                <a:cs typeface="Arial" panose="020B0604020202020204" pitchFamily="34" charset="0"/>
-              </a:rPr>
-              <a:t>used</a:t>
-            </a:r>
-            <a:r>
-              <a:rPr lang="nl-NL" sz="2400" dirty="0">
-                <a:latin typeface="Arial" panose="020B0604020202020204" pitchFamily="34" charset="0"/>
-                <a:cs typeface="Arial" panose="020B0604020202020204" pitchFamily="34" charset="0"/>
-              </a:rPr>
-              <a:t> </a:t>
-            </a:r>
-            <a:r>
-              <a:rPr lang="nl-NL" sz="2400" dirty="0" err="1">
-                <a:latin typeface="Arial" panose="020B0604020202020204" pitchFamily="34" charset="0"/>
-                <a:cs typeface="Arial" panose="020B0604020202020204" pitchFamily="34" charset="0"/>
-              </a:rPr>
-              <a:t>which</a:t>
-            </a:r>
-            <a:r>
-              <a:rPr lang="nl-NL" sz="2400" dirty="0">
-                <a:latin typeface="Arial" panose="020B0604020202020204" pitchFamily="34" charset="0"/>
-                <a:cs typeface="Arial" panose="020B0604020202020204" pitchFamily="34" charset="0"/>
-              </a:rPr>
-              <a:t> matches Era5 well. </a:t>
-            </a:r>
-          </a:p>
-          <a:p>
-            <a:pPr algn="ctr"/>
-            <a:r>
-              <a:rPr lang="nl-NL" sz="2400" dirty="0">
-                <a:latin typeface="Arial" panose="020B0604020202020204" pitchFamily="34" charset="0"/>
-                <a:cs typeface="Arial" panose="020B0604020202020204" pitchFamily="34" charset="0"/>
-              </a:rPr>
-              <a:t>Discharge station data is </a:t>
-            </a:r>
-            <a:r>
-              <a:rPr lang="nl-NL" sz="2400" dirty="0" err="1">
-                <a:latin typeface="Arial" panose="020B0604020202020204" pitchFamily="34" charset="0"/>
-                <a:cs typeface="Arial" panose="020B0604020202020204" pitchFamily="34" charset="0"/>
-              </a:rPr>
-              <a:t>retrieved</a:t>
-            </a:r>
-            <a:r>
-              <a:rPr lang="nl-NL" sz="2400" dirty="0">
-                <a:latin typeface="Arial" panose="020B0604020202020204" pitchFamily="34" charset="0"/>
-                <a:cs typeface="Arial" panose="020B0604020202020204" pitchFamily="34" charset="0"/>
-              </a:rPr>
-              <a:t> </a:t>
-            </a:r>
-            <a:r>
-              <a:rPr lang="nl-NL" sz="2400" dirty="0" err="1">
-                <a:latin typeface="Arial" panose="020B0604020202020204" pitchFamily="34" charset="0"/>
-                <a:cs typeface="Arial" panose="020B0604020202020204" pitchFamily="34" charset="0"/>
-              </a:rPr>
-              <a:t>from</a:t>
-            </a:r>
-            <a:r>
-              <a:rPr lang="nl-NL" sz="2400" dirty="0">
-                <a:latin typeface="Arial" panose="020B0604020202020204" pitchFamily="34" charset="0"/>
-                <a:cs typeface="Arial" panose="020B0604020202020204" pitchFamily="34" charset="0"/>
-              </a:rPr>
-              <a:t> USGS. </a:t>
-            </a:r>
-          </a:p>
-          <a:p>
-            <a:pPr algn="ctr"/>
-            <a:r>
-              <a:rPr lang="nl-NL" sz="2400" dirty="0">
-                <a:latin typeface="Arial" panose="020B0604020202020204" pitchFamily="34" charset="0"/>
-                <a:cs typeface="Arial" panose="020B0604020202020204" pitchFamily="34" charset="0"/>
-              </a:rPr>
-              <a:t>For </a:t>
-            </a:r>
-            <a:r>
-              <a:rPr lang="nl-NL" sz="2400" dirty="0" err="1">
-                <a:latin typeface="Arial" panose="020B0604020202020204" pitchFamily="34" charset="0"/>
-                <a:cs typeface="Arial" panose="020B0604020202020204" pitchFamily="34" charset="0"/>
-              </a:rPr>
-              <a:t>evaporation</a:t>
-            </a:r>
-            <a:r>
-              <a:rPr lang="nl-NL" sz="2400" dirty="0">
-                <a:latin typeface="Arial" panose="020B0604020202020204" pitchFamily="34" charset="0"/>
-                <a:cs typeface="Arial" panose="020B0604020202020204" pitchFamily="34" charset="0"/>
-              </a:rPr>
-              <a:t> data </a:t>
-            </a:r>
-            <a:r>
-              <a:rPr lang="nl-NL" sz="2400" dirty="0" err="1">
-                <a:latin typeface="Arial" panose="020B0604020202020204" pitchFamily="34" charset="0"/>
-                <a:cs typeface="Arial" panose="020B0604020202020204" pitchFamily="34" charset="0"/>
-              </a:rPr>
-              <a:t>obtain</a:t>
-            </a:r>
-            <a:r>
-              <a:rPr lang="nl-NL" sz="2400" dirty="0">
-                <a:latin typeface="Arial" panose="020B0604020202020204" pitchFamily="34" charset="0"/>
-                <a:cs typeface="Arial" panose="020B0604020202020204" pitchFamily="34" charset="0"/>
-              </a:rPr>
-              <a:t> </a:t>
-            </a:r>
-            <a:r>
-              <a:rPr lang="nl-NL" sz="2400" dirty="0" err="1">
-                <a:latin typeface="Arial" panose="020B0604020202020204" pitchFamily="34" charset="0"/>
-                <a:cs typeface="Arial" panose="020B0604020202020204" pitchFamily="34" charset="0"/>
-              </a:rPr>
-              <a:t>from</a:t>
-            </a:r>
-            <a:r>
-              <a:rPr lang="nl-NL" sz="2400" dirty="0">
-                <a:latin typeface="Arial" panose="020B0604020202020204" pitchFamily="34" charset="0"/>
-                <a:cs typeface="Arial" panose="020B0604020202020204" pitchFamily="34" charset="0"/>
-              </a:rPr>
-              <a:t> </a:t>
-            </a:r>
-            <a:r>
-              <a:rPr lang="en-US" sz="2400" dirty="0">
-                <a:latin typeface="Arial" panose="020B0604020202020204" pitchFamily="34" charset="0"/>
-                <a:cs typeface="Arial" panose="020B0604020202020204" pitchFamily="34" charset="0"/>
-              </a:rPr>
-              <a:t>Global Land Evaporation Amsterdam Model (GLEAM) is used. </a:t>
-            </a:r>
-            <a:r>
-              <a:rPr lang="nl-NL" sz="2400" dirty="0">
-                <a:latin typeface="Arial" panose="020B0604020202020204" pitchFamily="34" charset="0"/>
-                <a:cs typeface="Arial" panose="020B0604020202020204" pitchFamily="34" charset="0"/>
-              </a:rPr>
-              <a:t> </a:t>
-            </a:r>
-            <a:endParaRPr lang="nl-NL" sz="5000" dirty="0">
+            <a:pPr algn="just"/>
+            <a:r>
+              <a:rPr lang="en-GB" sz="2400" dirty="0">
+                <a:latin typeface="Arial" panose="020B0604020202020204" pitchFamily="34" charset="0"/>
+                <a:cs typeface="Arial" panose="020B0604020202020204" pitchFamily="34" charset="0"/>
+              </a:rPr>
+              <a:t>For the precipitation data, station data is used which matches Era5 well. The station data is averaged over the area by using Thiessen polygons. For evaporation data obtain from Global Land Evaporation Amsterdam Model (GLEAM) is used. Discharge station data is retrieved from USGS, the discharge of two stations in the lower part are added together. </a:t>
+            </a:r>
+          </a:p>
+          <a:p>
+            <a:pPr algn="just"/>
+            <a:r>
+              <a:rPr lang="en-GB" sz="2400" dirty="0">
+                <a:latin typeface="Arial" panose="020B0604020202020204" pitchFamily="34" charset="0"/>
+                <a:cs typeface="Arial" panose="020B0604020202020204" pitchFamily="34" charset="0"/>
+              </a:rPr>
+              <a:t>  </a:t>
+            </a:r>
+            <a:endParaRPr lang="en-GB" sz="5000" dirty="0">
               <a:latin typeface="Arial" panose="020B0604020202020204" pitchFamily="34" charset="0"/>
               <a:cs typeface="Arial" panose="020B0604020202020204" pitchFamily="34" charset="0"/>
             </a:endParaRPr>
@@ -5153,7 +5132,7 @@
         </p:nvSpPr>
         <p:spPr>
           <a:xfrm>
-            <a:off x="2096851" y="8397761"/>
+            <a:off x="2002098" y="15091359"/>
             <a:ext cx="9940415" cy="1567872"/>
           </a:xfrm>
           <a:prstGeom prst="rect">
@@ -5490,7 +5469,7 @@
         <p:spPr>
           <a:xfrm>
             <a:off x="2096852" y="5045261"/>
-            <a:ext cx="9940414" cy="1965139"/>
+            <a:ext cx="9940414" cy="2337953"/>
           </a:xfrm>
           <a:prstGeom prst="rect">
             <a:avLst/>
@@ -5511,7 +5490,7 @@
                 <a:latin typeface="Arial" panose="020B0604020202020204" pitchFamily="34" charset="0"/>
                 <a:cs typeface="Arial" panose="020B0604020202020204" pitchFamily="34" charset="0"/>
               </a:rPr>
-              <a:t>The Hudson River Basin is located in the North East of the United States. The area is around 35,000 km</a:t>
+              <a:t>The Hudson River Basin is located in the North East of the United States, which is around 35,000 km</a:t>
             </a:r>
             <a:r>
               <a:rPr lang="en-GB" sz="2400" baseline="30000" dirty="0">
@@ -5525,99 +5504,36 @@
                 <a:latin typeface="Arial" panose="020B0604020202020204" pitchFamily="34" charset="0"/>
                 <a:cs typeface="Arial" panose="020B0604020202020204" pitchFamily="34" charset="0"/>
               </a:rPr>
-              <a:t>. The lower part of the basin is an estuary. Only the northern region is taken into account, as the river in the lower part is influenced by the sea. </a:t>
-            </a:r>
-            <a:r>
-              <a:rPr lang="nl-NL" sz="2400" dirty="0" err="1">
-                <a:latin typeface="Arial" panose="020B0604020202020204" pitchFamily="34" charset="0"/>
-                <a:cs typeface="Arial" panose="020B0604020202020204" pitchFamily="34" charset="0"/>
-              </a:rPr>
-              <a:t>Figure</a:t>
-            </a:r>
-            <a:r>
-              <a:rPr lang="nl-NL" sz="2400" dirty="0">
-                <a:latin typeface="Arial" panose="020B0604020202020204" pitchFamily="34" charset="0"/>
-                <a:cs typeface="Arial" panose="020B0604020202020204" pitchFamily="34" charset="0"/>
-              </a:rPr>
-              <a:t> </a:t>
-            </a:r>
-            <a:r>
-              <a:rPr lang="nl-NL" sz="2400" dirty="0" err="1">
-                <a:latin typeface="Arial" panose="020B0604020202020204" pitchFamily="34" charset="0"/>
-                <a:cs typeface="Arial" panose="020B0604020202020204" pitchFamily="34" charset="0"/>
-              </a:rPr>
-              <a:t>basin</a:t>
-            </a:r>
-            <a:r>
-              <a:rPr lang="nl-NL" sz="2400" dirty="0">
-                <a:latin typeface="Arial" panose="020B0604020202020204" pitchFamily="34" charset="0"/>
-                <a:cs typeface="Arial" panose="020B0604020202020204" pitchFamily="34" charset="0"/>
-              </a:rPr>
-              <a:t> + </a:t>
-            </a:r>
-            <a:r>
-              <a:rPr lang="nl-NL" sz="2400" dirty="0" err="1">
-                <a:latin typeface="Arial" panose="020B0604020202020204" pitchFamily="34" charset="0"/>
-                <a:cs typeface="Arial" panose="020B0604020202020204" pitchFamily="34" charset="0"/>
-              </a:rPr>
-              <a:t>thiessen</a:t>
-            </a:r>
-            <a:r>
-              <a:rPr lang="nl-NL" sz="2400" dirty="0">
-                <a:latin typeface="Arial" panose="020B0604020202020204" pitchFamily="34" charset="0"/>
-                <a:cs typeface="Arial" panose="020B0604020202020204" pitchFamily="34" charset="0"/>
-              </a:rPr>
-              <a:t> </a:t>
-            </a:r>
-            <a:r>
-              <a:rPr lang="nl-NL" sz="2400" dirty="0" err="1">
-                <a:latin typeface="Arial" panose="020B0604020202020204" pitchFamily="34" charset="0"/>
-                <a:cs typeface="Arial" panose="020B0604020202020204" pitchFamily="34" charset="0"/>
-              </a:rPr>
-              <a:t>polygon</a:t>
-            </a:r>
-            <a:r>
-              <a:rPr lang="nl-NL" sz="2400" dirty="0">
-                <a:latin typeface="Arial" panose="020B0604020202020204" pitchFamily="34" charset="0"/>
-                <a:cs typeface="Arial" panose="020B0604020202020204" pitchFamily="34" charset="0"/>
-              </a:rPr>
-              <a:t>? Discharge stations 2 stations </a:t>
-            </a:r>
-            <a:r>
-              <a:rPr lang="nl-NL" sz="2400" dirty="0" err="1">
-                <a:latin typeface="Arial" panose="020B0604020202020204" pitchFamily="34" charset="0"/>
-                <a:cs typeface="Arial" panose="020B0604020202020204" pitchFamily="34" charset="0"/>
-              </a:rPr>
-              <a:t>summed</a:t>
-            </a:r>
-            <a:r>
-              <a:rPr lang="nl-NL" sz="2400" dirty="0">
-                <a:latin typeface="Arial" panose="020B0604020202020204" pitchFamily="34" charset="0"/>
-                <a:cs typeface="Arial" panose="020B0604020202020204" pitchFamily="34" charset="0"/>
-              </a:rPr>
-              <a:t> up (area </a:t>
-            </a:r>
-            <a:r>
-              <a:rPr lang="nl-NL" sz="2400" dirty="0" err="1">
-                <a:latin typeface="Arial" panose="020B0604020202020204" pitchFamily="34" charset="0"/>
-                <a:cs typeface="Arial" panose="020B0604020202020204" pitchFamily="34" charset="0"/>
-              </a:rPr>
-              <a:t>included</a:t>
-            </a:r>
-            <a:r>
-              <a:rPr lang="nl-NL" sz="2400" dirty="0">
-                <a:latin typeface="Arial" panose="020B0604020202020204" pitchFamily="34" charset="0"/>
-                <a:cs typeface="Arial" panose="020B0604020202020204" pitchFamily="34" charset="0"/>
-              </a:rPr>
-              <a:t>)</a:t>
-            </a:r>
-          </a:p>
-          <a:p>
-            <a:pPr algn="just"/>
-            <a:endParaRPr lang="en-GB" sz="2400" dirty="0">
-              <a:latin typeface="Arial" panose="020B0604020202020204" pitchFamily="34" charset="0"/>
-              <a:cs typeface="Arial" panose="020B0604020202020204" pitchFamily="34" charset="0"/>
-            </a:endParaRPr>
+              <a:t>. The lower part of the basin is an estuary. As the river in the lower part is influenced by the sea, only the Northern region is taken into account with an area of </a:t>
+            </a:r>
+            <a:r>
+              <a:rPr lang="en-GB" sz="2400" b="1" dirty="0">
+                <a:latin typeface="Arial" panose="020B0604020202020204" pitchFamily="34" charset="0"/>
+                <a:cs typeface="Arial" panose="020B0604020202020204" pitchFamily="34" charset="0"/>
+              </a:rPr>
+              <a:t>20,000 </a:t>
+            </a:r>
+            <a:r>
+              <a:rPr lang="en-GB" sz="2400" dirty="0">
+                <a:latin typeface="Arial" panose="020B0604020202020204" pitchFamily="34" charset="0"/>
+                <a:cs typeface="Arial" panose="020B0604020202020204" pitchFamily="34" charset="0"/>
+              </a:rPr>
+              <a:t>km</a:t>
+            </a:r>
+            <a:r>
+              <a:rPr lang="en-GB" sz="2400" baseline="30000" dirty="0">
+                <a:latin typeface="Arial" panose="020B0604020202020204" pitchFamily="34" charset="0"/>
+                <a:cs typeface="Arial" panose="020B0604020202020204" pitchFamily="34" charset="0"/>
+              </a:rPr>
+              <a:t>2</a:t>
+            </a:r>
+            <a:r>
+              <a:rPr lang="en-GB" sz="2400" dirty="0">
+                <a:latin typeface="Arial" panose="020B0604020202020204" pitchFamily="34" charset="0"/>
+                <a:cs typeface="Arial" panose="020B0604020202020204" pitchFamily="34" charset="0"/>
+              </a:rPr>
+              <a:t>. The region is showed in Figure 1. The area consists of forest, cropland and urban areas.</a:t>
+            </a:r>
           </a:p>
           <a:p>
             <a:pPr algn="just"/>
@@ -6397,7 +6313,7 @@
         </p:nvSpPr>
         <p:spPr>
           <a:xfrm>
-            <a:off x="1697583" y="7483228"/>
+            <a:off x="1602830" y="14176826"/>
             <a:ext cx="10800000" cy="814519"/>
           </a:xfrm>
           <a:prstGeom prst="rect">
@@ -6461,7 +6377,7 @@
         </p:nvSpPr>
         <p:spPr>
           <a:xfrm>
-            <a:off x="12890055" y="10550897"/>
+            <a:off x="12890055" y="11033497"/>
             <a:ext cx="16806366" cy="814519"/>
           </a:xfrm>
           <a:prstGeom prst="rect">
@@ -6528,7 +6444,7 @@
         </p:nvSpPr>
         <p:spPr>
           <a:xfrm>
-            <a:off x="12998697" y="11638141"/>
+            <a:off x="12998697" y="12019141"/>
             <a:ext cx="16546989" cy="2097528"/>
           </a:xfrm>
           <a:prstGeom prst="rect">
@@ -6592,81 +6508,6 @@
           </a:prstGeom>
         </p:spPr>
       </p:pic>
-      <p:sp>
-        <p:nvSpPr>
-          <p:cNvPr id="11" name="Tekstvak 9">
-            <a:extLst>
-              <a:ext uri="{FF2B5EF4-FFF2-40B4-BE49-F238E27FC236}">
-                <a16:creationId xmlns:a16="http://schemas.microsoft.com/office/drawing/2014/main" id="{2B8E93C6-F9F5-6B98-6EE5-C63022EE6BB2}"/>
-              </a:ext>
-            </a:extLst>
-          </p:cNvPr>
-          <p:cNvSpPr txBox="1"/>
-          <p:nvPr/>
-        </p:nvSpPr>
-        <p:spPr>
-          <a:xfrm>
-            <a:off x="5373226" y="12350876"/>
-            <a:ext cx="9940415" cy="1567872"/>
-          </a:xfrm>
-          <a:prstGeom prst="rect">
-            <a:avLst/>
-          </a:prstGeom>
-          <a:noFill/>
-          <a:ln>
-            <a:noFill/>
-          </a:ln>
-        </p:spPr>
-        <p:txBody>
-          <a:bodyPr wrap="square" numCol="1" rtlCol="0">
-            <a:noAutofit/>
-          </a:bodyPr>
-          <a:lstStyle/>
-          <a:p>
-            <a:pPr algn="just"/>
-            <a:r>
-              <a:rPr lang="nl-NL" sz="2400" dirty="0" err="1">
-                <a:highlight>
-                  <a:srgbClr val="FFFF00"/>
-                </a:highlight>
-                <a:latin typeface="Arial" panose="020B0604020202020204" pitchFamily="34" charset="0"/>
-                <a:cs typeface="Arial" panose="020B0604020202020204" pitchFamily="34" charset="0"/>
-              </a:rPr>
-              <a:t>To</a:t>
-            </a:r>
-            <a:r>
-              <a:rPr lang="nl-NL" sz="2400" dirty="0">
-                <a:highlight>
-                  <a:srgbClr val="FFFF00"/>
-                </a:highlight>
-                <a:latin typeface="Arial" panose="020B0604020202020204" pitchFamily="34" charset="0"/>
-                <a:cs typeface="Arial" panose="020B0604020202020204" pitchFamily="34" charset="0"/>
-              </a:rPr>
-              <a:t> do: </a:t>
-            </a:r>
-            <a:r>
-              <a:rPr lang="nl-NL" sz="2400" dirty="0" err="1">
-                <a:highlight>
-                  <a:srgbClr val="FFFF00"/>
-                </a:highlight>
-                <a:latin typeface="Arial" panose="020B0604020202020204" pitchFamily="34" charset="0"/>
-                <a:cs typeface="Arial" panose="020B0604020202020204" pitchFamily="34" charset="0"/>
-              </a:rPr>
-              <a:t>replace</a:t>
-            </a:r>
-            <a:r>
-              <a:rPr lang="nl-NL" sz="2400" dirty="0">
-                <a:highlight>
-                  <a:srgbClr val="FFFF00"/>
-                </a:highlight>
-                <a:latin typeface="Arial" panose="020B0604020202020204" pitchFamily="34" charset="0"/>
-                <a:cs typeface="Arial" panose="020B0604020202020204" pitchFamily="34" charset="0"/>
-              </a:rPr>
-              <a:t> image</a:t>
-            </a:r>
-          </a:p>
-        </p:txBody>
-      </p:sp>
       <p:pic>
         <p:nvPicPr>
           <p:cNvPr id="23" name="Picture 22" descr="A picture containing histogram&#10;&#10;Description automatically generated">
@@ -6695,7 +6536,7 @@
         </p:blipFill>
         <p:spPr>
           <a:xfrm>
-            <a:off x="13180547" y="6116939"/>
+            <a:off x="13180547" y="6459839"/>
             <a:ext cx="16068666" cy="4017167"/>
           </a:xfrm>
           <a:prstGeom prst="rect">
@@ -6703,6 +6544,167 @@
           </a:prstGeom>
         </p:spPr>
       </p:pic>
+      <p:sp>
+        <p:nvSpPr>
+          <p:cNvPr id="20" name="Tekstvak 19">
+            <a:extLst>
+              <a:ext uri="{FF2B5EF4-FFF2-40B4-BE49-F238E27FC236}">
+                <a16:creationId xmlns:a16="http://schemas.microsoft.com/office/drawing/2014/main" id="{B86F8254-E121-77DD-5085-BA2B06BD60CD}"/>
+              </a:ext>
+            </a:extLst>
+          </p:cNvPr>
+          <p:cNvSpPr txBox="1"/>
+          <p:nvPr/>
+        </p:nvSpPr>
+        <p:spPr>
+          <a:xfrm>
+            <a:off x="2096852" y="13481372"/>
+            <a:ext cx="9915920" cy="620840"/>
+          </a:xfrm>
+          <a:prstGeom prst="rect">
+            <a:avLst/>
+          </a:prstGeom>
+          <a:noFill/>
+          <a:ln>
+            <a:noFill/>
+          </a:ln>
+        </p:spPr>
+        <p:txBody>
+          <a:bodyPr wrap="square" numCol="1" rtlCol="0">
+            <a:noAutofit/>
+          </a:bodyPr>
+          <a:lstStyle/>
+          <a:p>
+            <a:pPr algn="just"/>
+            <a:r>
+              <a:rPr lang="en-GB" b="1" dirty="0">
+                <a:latin typeface="Arial" panose="020B0604020202020204" pitchFamily="34" charset="0"/>
+                <a:cs typeface="Arial" panose="020B0604020202020204" pitchFamily="34" charset="0"/>
+              </a:rPr>
+              <a:t>Figure 1</a:t>
+            </a:r>
+            <a:r>
+              <a:rPr lang="en-GB" dirty="0">
+                <a:latin typeface="Arial" panose="020B0604020202020204" pitchFamily="34" charset="0"/>
+                <a:cs typeface="Arial" panose="020B0604020202020204" pitchFamily="34" charset="0"/>
+              </a:rPr>
+              <a:t>. Considered upperpart of the Hudson River Basin. With dots, the different stations are 		  depicted.  </a:t>
+            </a:r>
+          </a:p>
+        </p:txBody>
+      </p:sp>
+      <p:sp>
+        <p:nvSpPr>
+          <p:cNvPr id="21" name="Tekstvak 20">
+            <a:extLst>
+              <a:ext uri="{FF2B5EF4-FFF2-40B4-BE49-F238E27FC236}">
+                <a16:creationId xmlns:a16="http://schemas.microsoft.com/office/drawing/2014/main" id="{816E3285-BDAB-3C2E-ADA5-98A8917B08DA}"/>
+              </a:ext>
+            </a:extLst>
+          </p:cNvPr>
+          <p:cNvSpPr txBox="1"/>
+          <p:nvPr/>
+        </p:nvSpPr>
+        <p:spPr>
+          <a:xfrm>
+            <a:off x="13437951" y="10468435"/>
+            <a:ext cx="15901579" cy="620840"/>
+          </a:xfrm>
+          <a:prstGeom prst="rect">
+            <a:avLst/>
+          </a:prstGeom>
+          <a:noFill/>
+          <a:ln>
+            <a:noFill/>
+          </a:ln>
+        </p:spPr>
+        <p:txBody>
+          <a:bodyPr wrap="square" numCol="1" rtlCol="0">
+            <a:noAutofit/>
+          </a:bodyPr>
+          <a:lstStyle/>
+          <a:p>
+            <a:pPr algn="just"/>
+            <a:r>
+              <a:rPr lang="en-GB" b="1" dirty="0">
+                <a:latin typeface="Arial" panose="020B0604020202020204" pitchFamily="34" charset="0"/>
+                <a:cs typeface="Arial" panose="020B0604020202020204" pitchFamily="34" charset="0"/>
+              </a:rPr>
+              <a:t>Figure 3</a:t>
+            </a:r>
+            <a:r>
+              <a:rPr lang="en-GB" dirty="0">
+                <a:latin typeface="Arial" panose="020B0604020202020204" pitchFamily="34" charset="0"/>
+                <a:cs typeface="Arial" panose="020B0604020202020204" pitchFamily="34" charset="0"/>
+              </a:rPr>
+              <a:t>. Data assimilation of precipitation (left) and evaporation (right) data. </a:t>
+            </a:r>
+          </a:p>
+        </p:txBody>
+      </p:sp>
+      <p:sp>
+        <p:nvSpPr>
+          <p:cNvPr id="25" name="Tekstvak 24">
+            <a:extLst>
+              <a:ext uri="{FF2B5EF4-FFF2-40B4-BE49-F238E27FC236}">
+                <a16:creationId xmlns:a16="http://schemas.microsoft.com/office/drawing/2014/main" id="{CDF9FE4F-A640-DE05-7EED-9A4E23824C4E}"/>
+              </a:ext>
+            </a:extLst>
+          </p:cNvPr>
+          <p:cNvSpPr txBox="1"/>
+          <p:nvPr/>
+        </p:nvSpPr>
+        <p:spPr>
+          <a:xfrm>
+            <a:off x="2096852" y="28077940"/>
+            <a:ext cx="9915920" cy="620840"/>
+          </a:xfrm>
+          <a:prstGeom prst="rect">
+            <a:avLst/>
+          </a:prstGeom>
+          <a:noFill/>
+          <a:ln>
+            <a:noFill/>
+          </a:ln>
+        </p:spPr>
+        <p:txBody>
+          <a:bodyPr wrap="square" numCol="1" rtlCol="0">
+            <a:noAutofit/>
+          </a:bodyPr>
+          <a:lstStyle/>
+          <a:p>
+            <a:pPr algn="just"/>
+            <a:r>
+              <a:rPr lang="en-GB" b="1" dirty="0">
+                <a:latin typeface="Arial" panose="020B0604020202020204" pitchFamily="34" charset="0"/>
+                <a:cs typeface="Arial" panose="020B0604020202020204" pitchFamily="34" charset="0"/>
+              </a:rPr>
+              <a:t>Figure 2</a:t>
+            </a:r>
+            <a:r>
+              <a:rPr lang="en-GB" dirty="0">
+                <a:latin typeface="Arial" panose="020B0604020202020204" pitchFamily="34" charset="0"/>
+                <a:cs typeface="Arial" panose="020B0604020202020204" pitchFamily="34" charset="0"/>
+              </a:rPr>
+              <a:t>. HBV model which is used to model the water cycle in the </a:t>
+            </a:r>
+            <a:r>
+              <a:rPr lang="en-GB" dirty="0" err="1">
+                <a:latin typeface="Arial" panose="020B0604020202020204" pitchFamily="34" charset="0"/>
+                <a:cs typeface="Arial" panose="020B0604020202020204" pitchFamily="34" charset="0"/>
+              </a:rPr>
+              <a:t>Husdon</a:t>
+            </a:r>
+            <a:r>
+              <a:rPr lang="en-GB" dirty="0">
+                <a:latin typeface="Arial" panose="020B0604020202020204" pitchFamily="34" charset="0"/>
+                <a:cs typeface="Arial" panose="020B0604020202020204" pitchFamily="34" charset="0"/>
+              </a:rPr>
+              <a:t> River Basin.</a:t>
+            </a:r>
+          </a:p>
+        </p:txBody>
+      </p:sp>
     </p:spTree>
     <p:extLst>
       <p:ext uri="{BB962C8B-B14F-4D97-AF65-F5344CB8AC3E}">

</xml_diff>

<commit_message>
tweaks to some images, spelling on the poster & fixing requirements
</commit_message>
<xml_diff>
--- a/Poster/Poster.pptx
+++ b/Poster/Poster.pptx
@@ -1057,7 +1057,7 @@
           <a:p>
             <a:fld id="{26FDFB3E-19C4-4117-A6C3-3DCDA680D6AE}" type="datetimeFigureOut">
               <a:rPr lang="en-NL" smtClean="0"/>
-              <a:t>04/16/2023</a:t>
+              <a:t>16/04/2023</a:t>
             </a:fld>
             <a:endParaRPr lang="en-NL"/>
           </a:p>
@@ -1216,7 +1216,7 @@
           <a:p>
             <a:fld id="{C73B8168-FC62-464C-9AD9-7C7DFCB5AB14}" type="slidenum">
               <a:rPr lang="en-NL" smtClean="0"/>
-              <a:t>‹nr.›</a:t>
+              <a:t>‹#›</a:t>
             </a:fld>
             <a:endParaRPr lang="en-NL"/>
           </a:p>
@@ -1582,7 +1582,7 @@
           <a:p>
             <a:fld id="{A8C721A8-0FC4-4D74-9D1D-FEFB5425F115}" type="slidenum">
               <a:rPr lang="nl-NL" smtClean="0"/>
-              <a:t>‹nr.›</a:t>
+              <a:t>‹#›</a:t>
             </a:fld>
             <a:endParaRPr lang="nl-NL"/>
           </a:p>
@@ -1752,7 +1752,7 @@
           <a:p>
             <a:fld id="{A8C721A8-0FC4-4D74-9D1D-FEFB5425F115}" type="slidenum">
               <a:rPr lang="nl-NL" smtClean="0"/>
-              <a:t>‹nr.›</a:t>
+              <a:t>‹#›</a:t>
             </a:fld>
             <a:endParaRPr lang="nl-NL"/>
           </a:p>
@@ -1932,7 +1932,7 @@
           <a:p>
             <a:fld id="{A8C721A8-0FC4-4D74-9D1D-FEFB5425F115}" type="slidenum">
               <a:rPr lang="nl-NL" smtClean="0"/>
-              <a:t>‹nr.›</a:t>
+              <a:t>‹#›</a:t>
             </a:fld>
             <a:endParaRPr lang="nl-NL"/>
           </a:p>
@@ -2102,7 +2102,7 @@
           <a:p>
             <a:fld id="{A8C721A8-0FC4-4D74-9D1D-FEFB5425F115}" type="slidenum">
               <a:rPr lang="nl-NL" smtClean="0"/>
-              <a:t>‹nr.›</a:t>
+              <a:t>‹#›</a:t>
             </a:fld>
             <a:endParaRPr lang="nl-NL"/>
           </a:p>
@@ -2346,7 +2346,7 @@
           <a:p>
             <a:fld id="{A8C721A8-0FC4-4D74-9D1D-FEFB5425F115}" type="slidenum">
               <a:rPr lang="nl-NL" smtClean="0"/>
-              <a:t>‹nr.›</a:t>
+              <a:t>‹#›</a:t>
             </a:fld>
             <a:endParaRPr lang="nl-NL"/>
           </a:p>
@@ -2578,7 +2578,7 @@
           <a:p>
             <a:fld id="{A8C721A8-0FC4-4D74-9D1D-FEFB5425F115}" type="slidenum">
               <a:rPr lang="nl-NL" smtClean="0"/>
-              <a:t>‹nr.›</a:t>
+              <a:t>‹#›</a:t>
             </a:fld>
             <a:endParaRPr lang="nl-NL"/>
           </a:p>
@@ -2945,7 +2945,7 @@
           <a:p>
             <a:fld id="{A8C721A8-0FC4-4D74-9D1D-FEFB5425F115}" type="slidenum">
               <a:rPr lang="nl-NL" smtClean="0"/>
-              <a:t>‹nr.›</a:t>
+              <a:t>‹#›</a:t>
             </a:fld>
             <a:endParaRPr lang="nl-NL"/>
           </a:p>
@@ -3063,7 +3063,7 @@
           <a:p>
             <a:fld id="{A8C721A8-0FC4-4D74-9D1D-FEFB5425F115}" type="slidenum">
               <a:rPr lang="nl-NL" smtClean="0"/>
-              <a:t>‹nr.›</a:t>
+              <a:t>‹#›</a:t>
             </a:fld>
             <a:endParaRPr lang="nl-NL"/>
           </a:p>
@@ -3158,7 +3158,7 @@
           <a:p>
             <a:fld id="{A8C721A8-0FC4-4D74-9D1D-FEFB5425F115}" type="slidenum">
               <a:rPr lang="nl-NL" smtClean="0"/>
-              <a:t>‹nr.›</a:t>
+              <a:t>‹#›</a:t>
             </a:fld>
             <a:endParaRPr lang="nl-NL"/>
           </a:p>
@@ -3435,7 +3435,7 @@
           <a:p>
             <a:fld id="{A8C721A8-0FC4-4D74-9D1D-FEFB5425F115}" type="slidenum">
               <a:rPr lang="nl-NL" smtClean="0"/>
-              <a:t>‹nr.›</a:t>
+              <a:t>‹#›</a:t>
             </a:fld>
             <a:endParaRPr lang="nl-NL"/>
           </a:p>
@@ -3692,7 +3692,7 @@
           <a:p>
             <a:fld id="{A8C721A8-0FC4-4D74-9D1D-FEFB5425F115}" type="slidenum">
               <a:rPr lang="nl-NL" smtClean="0"/>
-              <a:t>‹nr.›</a:t>
+              <a:t>‹#›</a:t>
             </a:fld>
             <a:endParaRPr lang="nl-NL"/>
           </a:p>
@@ -3941,7 +3941,7 @@
           <a:p>
             <a:fld id="{A8C721A8-0FC4-4D74-9D1D-FEFB5425F115}" type="slidenum">
               <a:rPr lang="nl-NL" smtClean="0"/>
-              <a:t>‹nr.›</a:t>
+              <a:t>‹#›</a:t>
             </a:fld>
             <a:endParaRPr lang="nl-NL"/>
           </a:p>
@@ -4376,7 +4376,7 @@
       </p:grpSp>
       <p:pic>
         <p:nvPicPr>
-          <p:cNvPr id="18" name="Afbeelding 17" descr="Afbeelding met kaart&#10;&#10;Automatisch gegenereerde beschrijving">
+          <p:cNvPr id="18" name="Afbeelding 17">
             <a:extLst>
               <a:ext uri="{FF2B5EF4-FFF2-40B4-BE49-F238E27FC236}">
                 <a16:creationId xmlns:a16="http://schemas.microsoft.com/office/drawing/2014/main" id="{9E4D005D-3920-DDA8-94AA-0687811630AC}"/>
@@ -4396,14 +4396,13 @@
               </a:ext>
             </a:extLst>
           </a:blip>
-          <a:stretch>
-            <a:fillRect/>
-          </a:stretch>
+          <a:srcRect l="1102" r="1102"/>
+          <a:stretch/>
         </p:blipFill>
         <p:spPr>
           <a:xfrm>
-            <a:off x="1772472" y="5988487"/>
-            <a:ext cx="10094066" cy="7138090"/>
+            <a:off x="2305094" y="6396822"/>
+            <a:ext cx="9246636" cy="6538824"/>
           </a:xfrm>
           <a:prstGeom prst="rect">
             <a:avLst/>
@@ -4424,7 +4423,7 @@
         </p:nvGrpSpPr>
         <p:grpSpPr>
           <a:xfrm>
-            <a:off x="0" y="28386479"/>
+            <a:off x="0" y="28386954"/>
             <a:ext cx="42803763" cy="1935219"/>
             <a:chOff x="0" y="28157879"/>
             <a:chExt cx="42803763" cy="1935219"/>
@@ -4558,7 +4557,7 @@
                 <a:latin typeface="Arial" panose="020B0604020202020204" pitchFamily="34" charset="0"/>
                 <a:cs typeface="Arial" panose="020B0604020202020204" pitchFamily="34" charset="0"/>
               </a:rPr>
-              <a:t>For the precipitation data, station data is used which matches ERA5 well. The station data is averaged over the area by using Thiessen polygons. For evaporation data obtain from Global Land Evaporation Amsterdam Model (GLEAM) is used. Discharge station data is retrieved from USGS, the discharge of two stations in the lower part are added together. </a:t>
+              <a:t>For the precipitation data, station data is used which matches ERA5 well. The station data is averaged over the area by using Thiessen polygons. For evaporation data obtained from Global Land Evaporation Amsterdam Model (GLEAM) is used. Discharge station data is retrieved from USGS, the discharge of two stations in the lower part are added together. </a:t>
             </a:r>
           </a:p>
           <a:p>
@@ -4628,7 +4627,7 @@
                 <a:latin typeface="Arial" panose="020B0604020202020204" pitchFamily="34" charset="0"/>
                 <a:cs typeface="Arial" panose="020B0604020202020204" pitchFamily="34" charset="0"/>
               </a:rPr>
-              <a:t>The modelled runoff has some uncertainties due to the uncertainty in data, but also in the chosen parameters. The 8 model parameters are calibrated using Monte Carlo, trying all different combinations is very time consuming. Almost all parameters show a uniform distribution over the range against the NSE. So a parameter is easily taken for example as too low (when is practical it is higher), resulting in calibrating also the others wrong. </a:t>
+              <a:t>The modelled runoff has some uncertainties due to the uncertainty in data, but also in the chosen parameters. The 8 model parameters are calibrated using Monte Carlo, trying all different combinations is very time consuming. Almost all parameters show a uniform distribution over the range against the NSE. So a parameter is easily guessed too low. In practice these should be higher, and thus the other parameters will fit much incorrectly.</a:t>
             </a:r>
           </a:p>
           <a:p>
@@ -4638,7 +4637,7 @@
                 <a:latin typeface="Arial" panose="020B0604020202020204" pitchFamily="34" charset="0"/>
                 <a:cs typeface="Arial" panose="020B0604020202020204" pitchFamily="34" charset="0"/>
               </a:rPr>
-              <a:t>As can be seen, during the summer months the runoff is overestimated. Next to uncertainty, could the occurrence of reservoirs explain part of the overestimation. In figure 5 are the reservoirs shown which are classified in QGIS. Reservoirs are not taken into account in the model. Using a parameter in the model which reduces the fast flows in the summer, could result in a better fit.    </a:t>
+              <a:t>As can be seen, during the summer months the runoff is overestimated. Next to uncertainty, the occurrence of reservoirs could explain part of the overestimation. In figure 5 the are reservoirs shown which are classified in QGIS. Reservoirs are not taken into account in the model. Using a parameter in the model which reduces the fast flows in the summer, could result in a better fit.    </a:t>
             </a:r>
           </a:p>
           <a:p>
@@ -4840,7 +4839,7 @@
         </p:nvSpPr>
         <p:spPr>
           <a:xfrm>
-            <a:off x="1359150" y="14579295"/>
+            <a:off x="1338491" y="14659816"/>
             <a:ext cx="10835687" cy="1567872"/>
           </a:xfrm>
           <a:prstGeom prst="rect">
@@ -4882,8 +4881,8 @@
         </p:nvSpPr>
         <p:spPr>
           <a:xfrm>
-            <a:off x="1359150" y="4393221"/>
-            <a:ext cx="10836000" cy="2337953"/>
+            <a:off x="1296252" y="4396733"/>
+            <a:ext cx="11231796" cy="2337953"/>
           </a:xfrm>
           <a:prstGeom prst="rect">
             <a:avLst/>
@@ -4946,7 +4945,7 @@
                 <a:latin typeface="Arial" panose="020B0604020202020204" pitchFamily="34" charset="0"/>
                 <a:cs typeface="Arial" panose="020B0604020202020204" pitchFamily="34" charset="0"/>
               </a:rPr>
-              <a:t>. The region is showed in Figure 1. The area consists of forest, cropland and urban areas.</a:t>
+              <a:t>. The region is showed in Figure 1. The area consists mainly of forest and cropland with some urban areas.</a:t>
             </a:r>
           </a:p>
           <a:p>
@@ -5023,7 +5022,7 @@
                 <a:latin typeface="Arial" panose="020B0604020202020204" pitchFamily="34" charset="0"/>
                 <a:cs typeface="Arial" panose="020B0604020202020204" pitchFamily="34" charset="0"/>
               </a:rPr>
-              <a:t>The HBV model consists of various elements which describe different processes in the water cycle. If the air temperature is below 0.5 </a:t>
+              <a:t>The HBV model consists of various elements which describe different processes in the water cycle. If the air temperature is below -0.5 </a:t>
             </a:r>
             <a:r>
               <a:rPr lang="en-GB" sz="2400" b="0" i="0" dirty="0">
@@ -5697,7 +5696,7 @@
         </p:blipFill>
         <p:spPr>
           <a:xfrm>
-            <a:off x="14107340" y="13986113"/>
+            <a:off x="14343688" y="13955242"/>
             <a:ext cx="13893465" cy="13893465"/>
           </a:xfrm>
           <a:prstGeom prst="rect">
@@ -5869,14 +5868,14 @@
                 <a:latin typeface="Arial" panose="020B0604020202020204" pitchFamily="34" charset="0"/>
                 <a:cs typeface="Arial" panose="020B0604020202020204" pitchFamily="34" charset="0"/>
               </a:rPr>
-              <a:t>The lumped HBV model is calibrated for 8 different parameters. The data is divided into sets of 4 years, each time the parameters are calibrated and than tested over the 4 following years. The Nash–Sutcliffe model efficiency coefficient (NSE) is calculated for each calibration, the closer to 1, the higher the predictive skill. The first 1.5 year are taken as spinoff and are not taken into account in calculating the NSE. For each calibration the same range of parameters is used. As can be seen in Figure 4, the NSE is decreasing over the years. Also the NSE of the test data is in most of the cases lower, with the largest difference in the years 1980-1983 and 1984-1987.</a:t>
+              <a:t>The lumped HBV model is calibrated for 8 different parameters. The data is divided into sets of 4 years, each time the parameters are calibrated and then tested over the 4 following years. The Nash–Sutcliffe model efficiency coefficient (NSE) is calculated for each calibration, the closer to 1, the higher the predictive skill. The first 1.5 year are taken as spinoff and are not taken into account in calculating the NSE. For each calibration the same range of parameters is used. As can be seen in Figure 4, the NSE is decreasing over the years. Also the NSE of the test data is in lower in most of the cases, with the largest difference in the years 1980-1983 and 1984-1987.</a:t>
             </a:r>
           </a:p>
         </p:txBody>
       </p:sp>
       <p:pic>
         <p:nvPicPr>
-          <p:cNvPr id="7" name="Picture 6" descr="Map&#10;&#10;Description automatically generated">
+          <p:cNvPr id="7" name="Picture 6">
             <a:extLst>
               <a:ext uri="{FF2B5EF4-FFF2-40B4-BE49-F238E27FC236}">
                 <a16:creationId xmlns:a16="http://schemas.microsoft.com/office/drawing/2014/main" id="{C5836706-27F9-E918-9C36-6651B0492623}"/>
@@ -5896,14 +5895,13 @@
               </a:ext>
             </a:extLst>
           </a:blip>
-          <a:stretch>
-            <a:fillRect/>
-          </a:stretch>
+          <a:srcRect/>
+          <a:stretch/>
         </p:blipFill>
         <p:spPr>
           <a:xfrm>
             <a:off x="31252033" y="8672604"/>
-            <a:ext cx="9388719" cy="7041539"/>
+            <a:ext cx="9388718" cy="7041539"/>
           </a:xfrm>
           <a:prstGeom prst="rect">
             <a:avLst/>
@@ -5912,7 +5910,7 @@
       </p:pic>
       <p:pic>
         <p:nvPicPr>
-          <p:cNvPr id="23" name="Picture 22" descr="A picture containing histogram&#10;&#10;Description automatically generated">
+          <p:cNvPr id="23" name="Picture 22">
             <a:extLst>
               <a:ext uri="{FF2B5EF4-FFF2-40B4-BE49-F238E27FC236}">
                 <a16:creationId xmlns:a16="http://schemas.microsoft.com/office/drawing/2014/main" id="{ADE426D4-03FF-DDF0-53FD-62D6C8188B96}"/>
@@ -5932,14 +5930,13 @@
               </a:ext>
             </a:extLst>
           </a:blip>
-          <a:stretch>
-            <a:fillRect/>
-          </a:stretch>
+          <a:srcRect/>
+          <a:stretch/>
         </p:blipFill>
         <p:spPr>
           <a:xfrm>
-            <a:off x="13180547" y="5655167"/>
-            <a:ext cx="16068666" cy="4017167"/>
+            <a:off x="13369879" y="5655167"/>
+            <a:ext cx="16068668" cy="4017167"/>
           </a:xfrm>
           <a:prstGeom prst="rect">
             <a:avLst/>
@@ -5960,8 +5957,8 @@
         </p:nvSpPr>
         <p:spPr>
           <a:xfrm>
-            <a:off x="2096852" y="12969308"/>
-            <a:ext cx="9915920" cy="620840"/>
+            <a:off x="1409210" y="13020101"/>
+            <a:ext cx="10603562" cy="620840"/>
           </a:xfrm>
           <a:prstGeom prst="rect">
             <a:avLst/>
@@ -6127,7 +6124,7 @@
                 <a:latin typeface="Arial" panose="020B0604020202020204" pitchFamily="34" charset="0"/>
                 <a:cs typeface="Arial" panose="020B0604020202020204" pitchFamily="34" charset="0"/>
               </a:rPr>
-              <a:t>Next to this, the distributed model under estimates the discharge during snowfall. The data is taken as average throughout the basin, but in practice it is a heterogenic area. For the distributed  model, 21 parameters are needed. This leads to too much uncertainty to use the model for predictions. </a:t>
+              <a:t>Besides this, the distributed model underestimates the discharge during snowfall. The data is taken as average throughout the basin, but in practice it is a heterogenic area. For the distributed  model, 21 parameters are needed. This leads to too much uncertainty to use the model for predictions. </a:t>
             </a:r>
           </a:p>
           <a:p>
@@ -6274,7 +6271,7 @@
                 <a:latin typeface="Arial" panose="020B0604020202020204" pitchFamily="34" charset="0"/>
                 <a:cs typeface="Arial" panose="020B0604020202020204" pitchFamily="34" charset="0"/>
               </a:rPr>
-              <a:t>Furthermore, both models have better outcome when same parameter range is chosen for the first 20 years based on the NSE.  When run several times, the model of the past 20 years score always lower than data used from 1980 till 2000. Th uncertainty is large, but it is a remarkable observation. </a:t>
+              <a:t>Furthermore, both models have better outcomes when the same parameter range is chosen for the first 20 years based on the NSE.  When run several times, the models of the past 20 years always score lower than data used from 1980 till 2000. The uncertainty is large, but it is a remarkable observation. </a:t>
             </a:r>
           </a:p>
           <a:p>
@@ -6291,7 +6288,7 @@
                 <a:latin typeface="Arial" panose="020B0604020202020204" pitchFamily="34" charset="0"/>
                 <a:cs typeface="Arial" panose="020B0604020202020204" pitchFamily="34" charset="0"/>
               </a:rPr>
-              <a:t>To calculate both the NSE and the NSE log are used. When using NSE, the runoff is more calibrated towards the peaks, while using the log NSE the baseflow and timing is better modelled. </a:t>
+              <a:t>To calculate both the NSE and the NSE log are used. When using NSE, the runoff is calibrated more towards the peaks, while using the log NSE the baseflow and timing is better modelled. </a:t>
             </a:r>
           </a:p>
           <a:p>
@@ -6325,7 +6322,7 @@
                 <a:latin typeface="Arial" panose="020B0604020202020204" pitchFamily="34" charset="0"/>
                 <a:cs typeface="Arial" panose="020B0604020202020204" pitchFamily="34" charset="0"/>
               </a:rPr>
-              <a:t>In this project, the model with highest NSE is chosen, while in practice this could not be the most useful model. Further research could be done by using generalized likelihood uncertainty estimation. Here, the NSE values are weighted and so are multiple solutions taken into account. </a:t>
+              <a:t>In this project, the model with highest NSE is chosen, while in practice this could not be the most useful model. Further research could be done by using generalized likelihood uncertainty estimation. Here, the NSE values are weighted and so multiple solutions are taken into account. </a:t>
             </a:r>
           </a:p>
         </p:txBody>
@@ -6379,6 +6376,165 @@
           <a:p>
             <a:pPr algn="ctr"/>
             <a:endParaRPr lang="nl-NL"/>
+          </a:p>
+        </p:txBody>
+      </p:sp>
+      <p:pic>
+        <p:nvPicPr>
+          <p:cNvPr id="40" name="Picture 39" descr="Qr code&#10;&#10;Description automatically generated">
+            <a:extLst>
+              <a:ext uri="{FF2B5EF4-FFF2-40B4-BE49-F238E27FC236}">
+                <a16:creationId xmlns:a16="http://schemas.microsoft.com/office/drawing/2014/main" id="{A3B80063-6965-ED32-D3E9-91A90FF637CE}"/>
+              </a:ext>
+            </a:extLst>
+          </p:cNvPr>
+          <p:cNvPicPr>
+            <a:picLocks noChangeAspect="1"/>
+          </p:cNvPicPr>
+          <p:nvPr/>
+        </p:nvPicPr>
+        <p:blipFill rotWithShape="1">
+          <a:blip r:embed="rId10">
+            <a:extLst>
+              <a:ext uri="{28A0092B-C50C-407E-A947-70E740481C1C}">
+                <a14:useLocalDpi xmlns:a14="http://schemas.microsoft.com/office/drawing/2010/main" val="0"/>
+              </a:ext>
+            </a:extLst>
+          </a:blip>
+          <a:srcRect l="6953" t="7388" r="7370" b="7680"/>
+          <a:stretch/>
+        </p:blipFill>
+        <p:spPr>
+          <a:xfrm>
+            <a:off x="2591399" y="28496786"/>
+            <a:ext cx="1275556" cy="1264444"/>
+          </a:xfrm>
+          <a:prstGeom prst="rect">
+            <a:avLst/>
+          </a:prstGeom>
+        </p:spPr>
+      </p:pic>
+      <p:sp>
+        <p:nvSpPr>
+          <p:cNvPr id="41" name="Tekstvak 24">
+            <a:extLst>
+              <a:ext uri="{FF2B5EF4-FFF2-40B4-BE49-F238E27FC236}">
+                <a16:creationId xmlns:a16="http://schemas.microsoft.com/office/drawing/2014/main" id="{4C59F3AC-D06B-552B-B2E5-A7C4081348A6}"/>
+              </a:ext>
+            </a:extLst>
+          </p:cNvPr>
+          <p:cNvSpPr txBox="1"/>
+          <p:nvPr/>
+        </p:nvSpPr>
+        <p:spPr>
+          <a:xfrm>
+            <a:off x="1296252" y="28485580"/>
+            <a:ext cx="1347388" cy="1286988"/>
+          </a:xfrm>
+          <a:prstGeom prst="rect">
+            <a:avLst/>
+          </a:prstGeom>
+          <a:noFill/>
+          <a:ln>
+            <a:noFill/>
+          </a:ln>
+        </p:spPr>
+        <p:txBody>
+          <a:bodyPr wrap="square" numCol="1" rtlCol="0">
+            <a:noAutofit/>
+          </a:bodyPr>
+          <a:lstStyle/>
+          <a:p>
+            <a:r>
+              <a:rPr lang="en-GB" dirty="0">
+                <a:solidFill>
+                  <a:schemeClr val="bg1"/>
+                </a:solidFill>
+                <a:latin typeface="Arial" panose="020B0604020202020204" pitchFamily="34" charset="0"/>
+                <a:cs typeface="Arial" panose="020B0604020202020204" pitchFamily="34" charset="0"/>
+              </a:rPr>
+              <a:t>All data and code available on GitHub</a:t>
+            </a:r>
+          </a:p>
+        </p:txBody>
+      </p:sp>
+      <p:pic>
+        <p:nvPicPr>
+          <p:cNvPr id="43" name="Picture 42" descr="Icon&#10;&#10;Description automatically generated">
+            <a:extLst>
+              <a:ext uri="{FF2B5EF4-FFF2-40B4-BE49-F238E27FC236}">
+                <a16:creationId xmlns:a16="http://schemas.microsoft.com/office/drawing/2014/main" id="{7F88CDC1-2A80-1159-716C-9E36B095D529}"/>
+              </a:ext>
+            </a:extLst>
+          </p:cNvPr>
+          <p:cNvPicPr>
+            <a:picLocks noChangeAspect="1"/>
+          </p:cNvPicPr>
+          <p:nvPr/>
+        </p:nvPicPr>
+        <p:blipFill>
+          <a:blip r:embed="rId11">
+            <a:extLst>
+              <a:ext uri="{28A0092B-C50C-407E-A947-70E740481C1C}">
+                <a14:useLocalDpi xmlns:a14="http://schemas.microsoft.com/office/drawing/2010/main" val="0"/>
+              </a:ext>
+            </a:extLst>
+          </a:blip>
+          <a:stretch>
+            <a:fillRect/>
+          </a:stretch>
+        </p:blipFill>
+        <p:spPr>
+          <a:xfrm>
+            <a:off x="-169874" y="28286904"/>
+            <a:ext cx="1706883" cy="1706883"/>
+          </a:xfrm>
+          <a:prstGeom prst="rect">
+            <a:avLst/>
+          </a:prstGeom>
+        </p:spPr>
+      </p:pic>
+      <p:sp>
+        <p:nvSpPr>
+          <p:cNvPr id="44" name="Tekstvak 24">
+            <a:extLst>
+              <a:ext uri="{FF2B5EF4-FFF2-40B4-BE49-F238E27FC236}">
+                <a16:creationId xmlns:a16="http://schemas.microsoft.com/office/drawing/2014/main" id="{4FB4BCA5-DD3A-FCBB-712A-F13B819B56F6}"/>
+              </a:ext>
+            </a:extLst>
+          </p:cNvPr>
+          <p:cNvSpPr txBox="1"/>
+          <p:nvPr/>
+        </p:nvSpPr>
+        <p:spPr>
+          <a:xfrm>
+            <a:off x="37255449" y="29327844"/>
+            <a:ext cx="1857623" cy="433386"/>
+          </a:xfrm>
+          <a:prstGeom prst="rect">
+            <a:avLst/>
+          </a:prstGeom>
+          <a:noFill/>
+          <a:ln>
+            <a:noFill/>
+          </a:ln>
+        </p:spPr>
+        <p:txBody>
+          <a:bodyPr wrap="square" numCol="1" rtlCol="0">
+            <a:noAutofit/>
+          </a:bodyPr>
+          <a:lstStyle/>
+          <a:p>
+            <a:r>
+              <a:rPr lang="en-GB" dirty="0">
+                <a:solidFill>
+                  <a:schemeClr val="bg1"/>
+                </a:solidFill>
+                <a:latin typeface="Arial" panose="020B0604020202020204" pitchFamily="34" charset="0"/>
+                <a:cs typeface="Arial" panose="020B0604020202020204" pitchFamily="34" charset="0"/>
+              </a:rPr>
+              <a:t>Msc ENVM1520</a:t>
+            </a:r>
           </a:p>
         </p:txBody>
       </p:sp>

</xml_diff>

<commit_message>
Checked and changed area northern region poster
</commit_message>
<xml_diff>
--- a/Poster/Poster.pptx
+++ b/Poster/Poster.pptx
@@ -1057,7 +1057,7 @@
           <a:p>
             <a:fld id="{26FDFB3E-19C4-4117-A6C3-3DCDA680D6AE}" type="datetimeFigureOut">
               <a:rPr lang="en-NL" smtClean="0"/>
-              <a:t>16/04/2023</a:t>
+              <a:t>04/17/2023</a:t>
             </a:fld>
             <a:endParaRPr lang="en-NL"/>
           </a:p>
@@ -1216,7 +1216,7 @@
           <a:p>
             <a:fld id="{C73B8168-FC62-464C-9AD9-7C7DFCB5AB14}" type="slidenum">
               <a:rPr lang="en-NL" smtClean="0"/>
-              <a:t>‹#›</a:t>
+              <a:t>‹nr.›</a:t>
             </a:fld>
             <a:endParaRPr lang="en-NL"/>
           </a:p>
@@ -1540,7 +1540,7 @@
           <a:p>
             <a:fld id="{207FE49C-52BE-48D3-BA01-22E72B34DE45}" type="datetimeFigureOut">
               <a:rPr lang="nl-NL" smtClean="0"/>
-              <a:t>16-4-2023</a:t>
+              <a:t>17-4-2023</a:t>
             </a:fld>
             <a:endParaRPr lang="nl-NL"/>
           </a:p>
@@ -1582,7 +1582,7 @@
           <a:p>
             <a:fld id="{A8C721A8-0FC4-4D74-9D1D-FEFB5425F115}" type="slidenum">
               <a:rPr lang="nl-NL" smtClean="0"/>
-              <a:t>‹#›</a:t>
+              <a:t>‹nr.›</a:t>
             </a:fld>
             <a:endParaRPr lang="nl-NL"/>
           </a:p>
@@ -1710,7 +1710,7 @@
           <a:p>
             <a:fld id="{207FE49C-52BE-48D3-BA01-22E72B34DE45}" type="datetimeFigureOut">
               <a:rPr lang="nl-NL" smtClean="0"/>
-              <a:t>16-4-2023</a:t>
+              <a:t>17-4-2023</a:t>
             </a:fld>
             <a:endParaRPr lang="nl-NL"/>
           </a:p>
@@ -1752,7 +1752,7 @@
           <a:p>
             <a:fld id="{A8C721A8-0FC4-4D74-9D1D-FEFB5425F115}" type="slidenum">
               <a:rPr lang="nl-NL" smtClean="0"/>
-              <a:t>‹#›</a:t>
+              <a:t>‹nr.›</a:t>
             </a:fld>
             <a:endParaRPr lang="nl-NL"/>
           </a:p>
@@ -1890,7 +1890,7 @@
           <a:p>
             <a:fld id="{207FE49C-52BE-48D3-BA01-22E72B34DE45}" type="datetimeFigureOut">
               <a:rPr lang="nl-NL" smtClean="0"/>
-              <a:t>16-4-2023</a:t>
+              <a:t>17-4-2023</a:t>
             </a:fld>
             <a:endParaRPr lang="nl-NL"/>
           </a:p>
@@ -1932,7 +1932,7 @@
           <a:p>
             <a:fld id="{A8C721A8-0FC4-4D74-9D1D-FEFB5425F115}" type="slidenum">
               <a:rPr lang="nl-NL" smtClean="0"/>
-              <a:t>‹#›</a:t>
+              <a:t>‹nr.›</a:t>
             </a:fld>
             <a:endParaRPr lang="nl-NL"/>
           </a:p>
@@ -2060,7 +2060,7 @@
           <a:p>
             <a:fld id="{207FE49C-52BE-48D3-BA01-22E72B34DE45}" type="datetimeFigureOut">
               <a:rPr lang="nl-NL" smtClean="0"/>
-              <a:t>16-4-2023</a:t>
+              <a:t>17-4-2023</a:t>
             </a:fld>
             <a:endParaRPr lang="nl-NL"/>
           </a:p>
@@ -2102,7 +2102,7 @@
           <a:p>
             <a:fld id="{A8C721A8-0FC4-4D74-9D1D-FEFB5425F115}" type="slidenum">
               <a:rPr lang="nl-NL" smtClean="0"/>
-              <a:t>‹#›</a:t>
+              <a:t>‹nr.›</a:t>
             </a:fld>
             <a:endParaRPr lang="nl-NL"/>
           </a:p>
@@ -2304,7 +2304,7 @@
           <a:p>
             <a:fld id="{207FE49C-52BE-48D3-BA01-22E72B34DE45}" type="datetimeFigureOut">
               <a:rPr lang="nl-NL" smtClean="0"/>
-              <a:t>16-4-2023</a:t>
+              <a:t>17-4-2023</a:t>
             </a:fld>
             <a:endParaRPr lang="nl-NL"/>
           </a:p>
@@ -2346,7 +2346,7 @@
           <a:p>
             <a:fld id="{A8C721A8-0FC4-4D74-9D1D-FEFB5425F115}" type="slidenum">
               <a:rPr lang="nl-NL" smtClean="0"/>
-              <a:t>‹#›</a:t>
+              <a:t>‹nr.›</a:t>
             </a:fld>
             <a:endParaRPr lang="nl-NL"/>
           </a:p>
@@ -2536,7 +2536,7 @@
           <a:p>
             <a:fld id="{207FE49C-52BE-48D3-BA01-22E72B34DE45}" type="datetimeFigureOut">
               <a:rPr lang="nl-NL" smtClean="0"/>
-              <a:t>16-4-2023</a:t>
+              <a:t>17-4-2023</a:t>
             </a:fld>
             <a:endParaRPr lang="nl-NL"/>
           </a:p>
@@ -2578,7 +2578,7 @@
           <a:p>
             <a:fld id="{A8C721A8-0FC4-4D74-9D1D-FEFB5425F115}" type="slidenum">
               <a:rPr lang="nl-NL" smtClean="0"/>
-              <a:t>‹#›</a:t>
+              <a:t>‹nr.›</a:t>
             </a:fld>
             <a:endParaRPr lang="nl-NL"/>
           </a:p>
@@ -2903,7 +2903,7 @@
           <a:p>
             <a:fld id="{207FE49C-52BE-48D3-BA01-22E72B34DE45}" type="datetimeFigureOut">
               <a:rPr lang="nl-NL" smtClean="0"/>
-              <a:t>16-4-2023</a:t>
+              <a:t>17-4-2023</a:t>
             </a:fld>
             <a:endParaRPr lang="nl-NL"/>
           </a:p>
@@ -2945,7 +2945,7 @@
           <a:p>
             <a:fld id="{A8C721A8-0FC4-4D74-9D1D-FEFB5425F115}" type="slidenum">
               <a:rPr lang="nl-NL" smtClean="0"/>
-              <a:t>‹#›</a:t>
+              <a:t>‹nr.›</a:t>
             </a:fld>
             <a:endParaRPr lang="nl-NL"/>
           </a:p>
@@ -3021,7 +3021,7 @@
           <a:p>
             <a:fld id="{207FE49C-52BE-48D3-BA01-22E72B34DE45}" type="datetimeFigureOut">
               <a:rPr lang="nl-NL" smtClean="0"/>
-              <a:t>16-4-2023</a:t>
+              <a:t>17-4-2023</a:t>
             </a:fld>
             <a:endParaRPr lang="nl-NL"/>
           </a:p>
@@ -3063,7 +3063,7 @@
           <a:p>
             <a:fld id="{A8C721A8-0FC4-4D74-9D1D-FEFB5425F115}" type="slidenum">
               <a:rPr lang="nl-NL" smtClean="0"/>
-              <a:t>‹#›</a:t>
+              <a:t>‹nr.›</a:t>
             </a:fld>
             <a:endParaRPr lang="nl-NL"/>
           </a:p>
@@ -3116,7 +3116,7 @@
           <a:p>
             <a:fld id="{207FE49C-52BE-48D3-BA01-22E72B34DE45}" type="datetimeFigureOut">
               <a:rPr lang="nl-NL" smtClean="0"/>
-              <a:t>16-4-2023</a:t>
+              <a:t>17-4-2023</a:t>
             </a:fld>
             <a:endParaRPr lang="nl-NL"/>
           </a:p>
@@ -3158,7 +3158,7 @@
           <a:p>
             <a:fld id="{A8C721A8-0FC4-4D74-9D1D-FEFB5425F115}" type="slidenum">
               <a:rPr lang="nl-NL" smtClean="0"/>
-              <a:t>‹#›</a:t>
+              <a:t>‹nr.›</a:t>
             </a:fld>
             <a:endParaRPr lang="nl-NL"/>
           </a:p>
@@ -3393,7 +3393,7 @@
           <a:p>
             <a:fld id="{207FE49C-52BE-48D3-BA01-22E72B34DE45}" type="datetimeFigureOut">
               <a:rPr lang="nl-NL" smtClean="0"/>
-              <a:t>16-4-2023</a:t>
+              <a:t>17-4-2023</a:t>
             </a:fld>
             <a:endParaRPr lang="nl-NL"/>
           </a:p>
@@ -3435,7 +3435,7 @@
           <a:p>
             <a:fld id="{A8C721A8-0FC4-4D74-9D1D-FEFB5425F115}" type="slidenum">
               <a:rPr lang="nl-NL" smtClean="0"/>
-              <a:t>‹#›</a:t>
+              <a:t>‹nr.›</a:t>
             </a:fld>
             <a:endParaRPr lang="nl-NL"/>
           </a:p>
@@ -3650,7 +3650,7 @@
           <a:p>
             <a:fld id="{207FE49C-52BE-48D3-BA01-22E72B34DE45}" type="datetimeFigureOut">
               <a:rPr lang="nl-NL" smtClean="0"/>
-              <a:t>16-4-2023</a:t>
+              <a:t>17-4-2023</a:t>
             </a:fld>
             <a:endParaRPr lang="nl-NL"/>
           </a:p>
@@ -3692,7 +3692,7 @@
           <a:p>
             <a:fld id="{A8C721A8-0FC4-4D74-9D1D-FEFB5425F115}" type="slidenum">
               <a:rPr lang="nl-NL" smtClean="0"/>
-              <a:t>‹#›</a:t>
+              <a:t>‹nr.›</a:t>
             </a:fld>
             <a:endParaRPr lang="nl-NL"/>
           </a:p>
@@ -3863,7 +3863,7 @@
           <a:p>
             <a:fld id="{207FE49C-52BE-48D3-BA01-22E72B34DE45}" type="datetimeFigureOut">
               <a:rPr lang="nl-NL" smtClean="0"/>
-              <a:t>16-4-2023</a:t>
+              <a:t>17-4-2023</a:t>
             </a:fld>
             <a:endParaRPr lang="nl-NL"/>
           </a:p>
@@ -3941,7 +3941,7 @@
           <a:p>
             <a:fld id="{A8C721A8-0FC4-4D74-9D1D-FEFB5425F115}" type="slidenum">
               <a:rPr lang="nl-NL" smtClean="0"/>
-              <a:t>‹#›</a:t>
+              <a:t>‹nr.›</a:t>
             </a:fld>
             <a:endParaRPr lang="nl-NL"/>
           </a:p>
@@ -4917,14 +4917,28 @@
                 <a:latin typeface="Arial" panose="020B0604020202020204" pitchFamily="34" charset="0"/>
                 <a:cs typeface="Arial" panose="020B0604020202020204" pitchFamily="34" charset="0"/>
               </a:rPr>
-              <a:t>. The lower part of the basin is an estuary. As the river in the lower part is influenced by the sea, only the Northern region is taken into account with an area of </a:t>
+              <a:t>. The lower part of the basin is an estuary. As the river in the lower part is influenced by the sea, only the Northern region is taken into account with an area of</a:t>
             </a:r>
             <a:r>
               <a:rPr lang="en-GB" sz="2400" b="1" dirty="0">
                 <a:latin typeface="Arial" panose="020B0604020202020204" pitchFamily="34" charset="0"/>
                 <a:cs typeface="Arial" panose="020B0604020202020204" pitchFamily="34" charset="0"/>
               </a:rPr>
-              <a:t>20,000 </a:t>
+              <a:t> </a:t>
+            </a:r>
+            <a:r>
+              <a:rPr lang="en-GB" sz="2400" dirty="0">
+                <a:latin typeface="Arial" panose="020B0604020202020204" pitchFamily="34" charset="0"/>
+                <a:cs typeface="Arial" panose="020B0604020202020204" pitchFamily="34" charset="0"/>
+              </a:rPr>
+              <a:t>21,000</a:t>
+            </a:r>
+            <a:r>
+              <a:rPr lang="en-GB" sz="2400" b="1" dirty="0">
+                <a:latin typeface="Arial" panose="020B0604020202020204" pitchFamily="34" charset="0"/>
+                <a:cs typeface="Arial" panose="020B0604020202020204" pitchFamily="34" charset="0"/>
+              </a:rPr>
+              <a:t> </a:t>
             </a:r>
             <a:r>
               <a:rPr lang="en-GB" sz="2400" dirty="0">

</xml_diff>